<commit_message>
Added new version of the ppt
</commit_message>
<xml_diff>
--- a/Microsoft Cognitive Services and Custom Vision.pptx
+++ b/Microsoft Cognitive Services and Custom Vision.pptx
@@ -6,9 +6,13 @@
   </p:sldMasterIdLst>
   <p:sldIdLst>
     <p:sldId id="256" r:id="rId2"/>
-    <p:sldId id="257" r:id="rId3"/>
-    <p:sldId id="258" r:id="rId4"/>
-    <p:sldId id="259" r:id="rId5"/>
+    <p:sldId id="261" r:id="rId3"/>
+    <p:sldId id="262" r:id="rId4"/>
+    <p:sldId id="257" r:id="rId5"/>
+    <p:sldId id="260" r:id="rId6"/>
+    <p:sldId id="263" r:id="rId7"/>
+    <p:sldId id="258" r:id="rId8"/>
+    <p:sldId id="259" r:id="rId9"/>
   </p:sldIdLst>
   <p:sldSz cx="12192000" cy="6858000"/>
   <p:notesSz cx="6858000" cy="9144000"/>
@@ -107,6 +111,11 @@
       </a:defRPr>
     </a:lvl9pPr>
   </p:defaultTextStyle>
+  <p:extLst>
+    <p:ext uri="{EFAFB233-063F-42B5-8137-9DF3F51BA10A}">
+      <p15:sldGuideLst xmlns:p15="http://schemas.microsoft.com/office/powerpoint/2012/main"/>
+    </p:ext>
+  </p:extLst>
 </p:presentation>
 </file>
 
@@ -257,7 +266,7 @@
           <a:p>
             <a:fld id="{AD2CA3B8-1545-400E-8560-E9F160DC3A33}" type="datetimeFigureOut">
               <a:rPr lang="es-ES" smtClean="0"/>
-              <a:t>11/03/2019</a:t>
+              <a:t>12/03/2019</a:t>
             </a:fld>
             <a:endParaRPr lang="es-ES"/>
           </a:p>
@@ -455,7 +464,7 @@
           <a:p>
             <a:fld id="{AD2CA3B8-1545-400E-8560-E9F160DC3A33}" type="datetimeFigureOut">
               <a:rPr lang="es-ES" smtClean="0"/>
-              <a:t>11/03/2019</a:t>
+              <a:t>12/03/2019</a:t>
             </a:fld>
             <a:endParaRPr lang="es-ES"/>
           </a:p>
@@ -663,7 +672,7 @@
           <a:p>
             <a:fld id="{AD2CA3B8-1545-400E-8560-E9F160DC3A33}" type="datetimeFigureOut">
               <a:rPr lang="es-ES" smtClean="0"/>
-              <a:t>11/03/2019</a:t>
+              <a:t>12/03/2019</a:t>
             </a:fld>
             <a:endParaRPr lang="es-ES"/>
           </a:p>
@@ -861,7 +870,7 @@
           <a:p>
             <a:fld id="{AD2CA3B8-1545-400E-8560-E9F160DC3A33}" type="datetimeFigureOut">
               <a:rPr lang="es-ES" smtClean="0"/>
-              <a:t>11/03/2019</a:t>
+              <a:t>12/03/2019</a:t>
             </a:fld>
             <a:endParaRPr lang="es-ES"/>
           </a:p>
@@ -1136,7 +1145,7 @@
           <a:p>
             <a:fld id="{AD2CA3B8-1545-400E-8560-E9F160DC3A33}" type="datetimeFigureOut">
               <a:rPr lang="es-ES" smtClean="0"/>
-              <a:t>11/03/2019</a:t>
+              <a:t>12/03/2019</a:t>
             </a:fld>
             <a:endParaRPr lang="es-ES"/>
           </a:p>
@@ -1401,7 +1410,7 @@
           <a:p>
             <a:fld id="{AD2CA3B8-1545-400E-8560-E9F160DC3A33}" type="datetimeFigureOut">
               <a:rPr lang="es-ES" smtClean="0"/>
-              <a:t>11/03/2019</a:t>
+              <a:t>12/03/2019</a:t>
             </a:fld>
             <a:endParaRPr lang="es-ES"/>
           </a:p>
@@ -1813,7 +1822,7 @@
           <a:p>
             <a:fld id="{AD2CA3B8-1545-400E-8560-E9F160DC3A33}" type="datetimeFigureOut">
               <a:rPr lang="es-ES" smtClean="0"/>
-              <a:t>11/03/2019</a:t>
+              <a:t>12/03/2019</a:t>
             </a:fld>
             <a:endParaRPr lang="es-ES"/>
           </a:p>
@@ -1954,7 +1963,7 @@
           <a:p>
             <a:fld id="{AD2CA3B8-1545-400E-8560-E9F160DC3A33}" type="datetimeFigureOut">
               <a:rPr lang="es-ES" smtClean="0"/>
-              <a:t>11/03/2019</a:t>
+              <a:t>12/03/2019</a:t>
             </a:fld>
             <a:endParaRPr lang="es-ES"/>
           </a:p>
@@ -2067,7 +2076,7 @@
           <a:p>
             <a:fld id="{AD2CA3B8-1545-400E-8560-E9F160DC3A33}" type="datetimeFigureOut">
               <a:rPr lang="es-ES" smtClean="0"/>
-              <a:t>11/03/2019</a:t>
+              <a:t>12/03/2019</a:t>
             </a:fld>
             <a:endParaRPr lang="es-ES"/>
           </a:p>
@@ -2378,7 +2387,7 @@
           <a:p>
             <a:fld id="{AD2CA3B8-1545-400E-8560-E9F160DC3A33}" type="datetimeFigureOut">
               <a:rPr lang="es-ES" smtClean="0"/>
-              <a:t>11/03/2019</a:t>
+              <a:t>12/03/2019</a:t>
             </a:fld>
             <a:endParaRPr lang="es-ES"/>
           </a:p>
@@ -2666,7 +2675,7 @@
           <a:p>
             <a:fld id="{AD2CA3B8-1545-400E-8560-E9F160DC3A33}" type="datetimeFigureOut">
               <a:rPr lang="es-ES" smtClean="0"/>
-              <a:t>11/03/2019</a:t>
+              <a:t>12/03/2019</a:t>
             </a:fld>
             <a:endParaRPr lang="es-ES"/>
           </a:p>
@@ -2907,7 +2916,7 @@
           <a:p>
             <a:fld id="{AD2CA3B8-1545-400E-8560-E9F160DC3A33}" type="datetimeFigureOut">
               <a:rPr lang="es-ES" smtClean="0"/>
-              <a:t>11/03/2019</a:t>
+              <a:t>12/03/2019</a:t>
             </a:fld>
             <a:endParaRPr lang="es-ES"/>
           </a:p>
@@ -3450,6 +3459,203 @@
           <p:cNvPr id="2" name="Título 1">
             <a:extLst>
               <a:ext uri="{FF2B5EF4-FFF2-40B4-BE49-F238E27FC236}">
+                <a16:creationId xmlns:a16="http://schemas.microsoft.com/office/drawing/2014/main" id="{7492C75C-01B6-4E6A-8AE8-BE6B7D6A3D2C}"/>
+              </a:ext>
+            </a:extLst>
+          </p:cNvPr>
+          <p:cNvSpPr>
+            <a:spLocks noGrp="1"/>
+          </p:cNvSpPr>
+          <p:nvPr>
+            <p:ph type="title"/>
+          </p:nvPr>
+        </p:nvSpPr>
+        <p:spPr/>
+        <p:txBody>
+          <a:bodyPr/>
+          <a:lstStyle/>
+          <a:p>
+            <a:endParaRPr lang="es-ES"/>
+          </a:p>
+        </p:txBody>
+      </p:sp>
+      <p:pic>
+        <p:nvPicPr>
+          <p:cNvPr id="4" name="Marcador de contenido 3">
+            <a:extLst>
+              <a:ext uri="{FF2B5EF4-FFF2-40B4-BE49-F238E27FC236}">
+                <a16:creationId xmlns:a16="http://schemas.microsoft.com/office/drawing/2014/main" id="{B798E63E-EF7D-4DD1-B834-05A0BD6E7C28}"/>
+              </a:ext>
+            </a:extLst>
+          </p:cNvPr>
+          <p:cNvPicPr>
+            <a:picLocks noGrp="1" noChangeAspect="1"/>
+          </p:cNvPicPr>
+          <p:nvPr>
+            <p:ph idx="1"/>
+          </p:nvPr>
+        </p:nvPicPr>
+        <p:blipFill>
+          <a:blip r:embed="rId2"/>
+          <a:stretch>
+            <a:fillRect/>
+          </a:stretch>
+        </p:blipFill>
+        <p:spPr>
+          <a:xfrm>
+            <a:off x="2504574" y="2038870"/>
+            <a:ext cx="7182852" cy="3924848"/>
+          </a:xfrm>
+          <a:prstGeom prst="rect">
+            <a:avLst/>
+          </a:prstGeom>
+        </p:spPr>
+      </p:pic>
+    </p:spTree>
+    <p:extLst>
+      <p:ext uri="{BB962C8B-B14F-4D97-AF65-F5344CB8AC3E}">
+        <p14:creationId xmlns:p14="http://schemas.microsoft.com/office/powerpoint/2010/main" val="153821854"/>
+      </p:ext>
+    </p:extLst>
+  </p:cSld>
+  <p:clrMapOvr>
+    <a:masterClrMapping/>
+  </p:clrMapOvr>
+</p:sld>
+</file>
+
+<file path=ppt/slides/slide3.xml><?xml version="1.0" encoding="utf-8"?>
+<p:sld xmlns:a="http://schemas.openxmlformats.org/drawingml/2006/main" xmlns:r="http://schemas.openxmlformats.org/officeDocument/2006/relationships" xmlns:p="http://schemas.openxmlformats.org/presentationml/2006/main">
+  <p:cSld>
+    <p:spTree>
+      <p:nvGrpSpPr>
+        <p:cNvPr id="1" name=""/>
+        <p:cNvGrpSpPr/>
+        <p:nvPr/>
+      </p:nvGrpSpPr>
+      <p:grpSpPr>
+        <a:xfrm>
+          <a:off x="0" y="0"/>
+          <a:ext cx="0" cy="0"/>
+          <a:chOff x="0" y="0"/>
+          <a:chExt cx="0" cy="0"/>
+        </a:xfrm>
+      </p:grpSpPr>
+      <p:sp>
+        <p:nvSpPr>
+          <p:cNvPr id="2" name="Título 1">
+            <a:extLst>
+              <a:ext uri="{FF2B5EF4-FFF2-40B4-BE49-F238E27FC236}">
+                <a16:creationId xmlns:a16="http://schemas.microsoft.com/office/drawing/2014/main" id="{1F6E59FC-9F4A-4B74-B0BB-EB88E6D0CAD0}"/>
+              </a:ext>
+            </a:extLst>
+          </p:cNvPr>
+          <p:cNvSpPr>
+            <a:spLocks noGrp="1"/>
+          </p:cNvSpPr>
+          <p:nvPr>
+            <p:ph type="title"/>
+          </p:nvPr>
+        </p:nvSpPr>
+        <p:spPr/>
+        <p:txBody>
+          <a:bodyPr/>
+          <a:lstStyle/>
+          <a:p>
+            <a:endParaRPr lang="es-ES"/>
+          </a:p>
+        </p:txBody>
+      </p:sp>
+      <p:sp>
+        <p:nvSpPr>
+          <p:cNvPr id="3" name="Marcador de contenido 2">
+            <a:extLst>
+              <a:ext uri="{FF2B5EF4-FFF2-40B4-BE49-F238E27FC236}">
+                <a16:creationId xmlns:a16="http://schemas.microsoft.com/office/drawing/2014/main" id="{5E5A6D3D-CB42-4AF0-AD36-24DAFAD74693}"/>
+              </a:ext>
+            </a:extLst>
+          </p:cNvPr>
+          <p:cNvSpPr>
+            <a:spLocks noGrp="1"/>
+          </p:cNvSpPr>
+          <p:nvPr>
+            <p:ph idx="1"/>
+          </p:nvPr>
+        </p:nvSpPr>
+        <p:spPr/>
+        <p:txBody>
+          <a:bodyPr/>
+          <a:lstStyle/>
+          <a:p>
+            <a:endParaRPr lang="es-ES"/>
+          </a:p>
+        </p:txBody>
+      </p:sp>
+      <p:pic>
+        <p:nvPicPr>
+          <p:cNvPr id="4" name="Imagen 3">
+            <a:extLst>
+              <a:ext uri="{FF2B5EF4-FFF2-40B4-BE49-F238E27FC236}">
+                <a16:creationId xmlns:a16="http://schemas.microsoft.com/office/drawing/2014/main" id="{F9B59A7B-DC6A-451E-96D8-0F356B678785}"/>
+              </a:ext>
+            </a:extLst>
+          </p:cNvPr>
+          <p:cNvPicPr>
+            <a:picLocks noChangeAspect="1"/>
+          </p:cNvPicPr>
+          <p:nvPr/>
+        </p:nvPicPr>
+        <p:blipFill>
+          <a:blip r:embed="rId2"/>
+          <a:stretch>
+            <a:fillRect/>
+          </a:stretch>
+        </p:blipFill>
+        <p:spPr>
+          <a:xfrm>
+            <a:off x="1713888" y="1333207"/>
+            <a:ext cx="8764223" cy="4191585"/>
+          </a:xfrm>
+          <a:prstGeom prst="rect">
+            <a:avLst/>
+          </a:prstGeom>
+        </p:spPr>
+      </p:pic>
+    </p:spTree>
+    <p:extLst>
+      <p:ext uri="{BB962C8B-B14F-4D97-AF65-F5344CB8AC3E}">
+        <p14:creationId xmlns:p14="http://schemas.microsoft.com/office/powerpoint/2010/main" val="1422541892"/>
+      </p:ext>
+    </p:extLst>
+  </p:cSld>
+  <p:clrMapOvr>
+    <a:masterClrMapping/>
+  </p:clrMapOvr>
+</p:sld>
+</file>
+
+<file path=ppt/slides/slide4.xml><?xml version="1.0" encoding="utf-8"?>
+<p:sld xmlns:a="http://schemas.openxmlformats.org/drawingml/2006/main" xmlns:r="http://schemas.openxmlformats.org/officeDocument/2006/relationships" xmlns:p="http://schemas.openxmlformats.org/presentationml/2006/main">
+  <p:cSld>
+    <p:spTree>
+      <p:nvGrpSpPr>
+        <p:cNvPr id="1" name=""/>
+        <p:cNvGrpSpPr/>
+        <p:nvPr/>
+      </p:nvGrpSpPr>
+      <p:grpSpPr>
+        <a:xfrm>
+          <a:off x="0" y="0"/>
+          <a:ext cx="0" cy="0"/>
+          <a:chOff x="0" y="0"/>
+          <a:chExt cx="0" cy="0"/>
+        </a:xfrm>
+      </p:grpSpPr>
+      <p:sp>
+        <p:nvSpPr>
+          <p:cNvPr id="2" name="Título 1">
+            <a:extLst>
+              <a:ext uri="{FF2B5EF4-FFF2-40B4-BE49-F238E27FC236}">
                 <a16:creationId xmlns:a16="http://schemas.microsoft.com/office/drawing/2014/main" id="{E696AA0C-2CC1-46B2-ACDF-DD51C3FCC294}"/>
               </a:ext>
             </a:extLst>
@@ -3546,7 +3752,238 @@
 </p:sld>
 </file>
 
-<file path=ppt/slides/slide3.xml><?xml version="1.0" encoding="utf-8"?>
+<file path=ppt/slides/slide5.xml><?xml version="1.0" encoding="utf-8"?>
+<p:sld xmlns:a="http://schemas.openxmlformats.org/drawingml/2006/main" xmlns:r="http://schemas.openxmlformats.org/officeDocument/2006/relationships" xmlns:p="http://schemas.openxmlformats.org/presentationml/2006/main">
+  <p:cSld>
+    <p:spTree>
+      <p:nvGrpSpPr>
+        <p:cNvPr id="1" name=""/>
+        <p:cNvGrpSpPr/>
+        <p:nvPr/>
+      </p:nvGrpSpPr>
+      <p:grpSpPr>
+        <a:xfrm>
+          <a:off x="0" y="0"/>
+          <a:ext cx="0" cy="0"/>
+          <a:chOff x="0" y="0"/>
+          <a:chExt cx="0" cy="0"/>
+        </a:xfrm>
+      </p:grpSpPr>
+      <p:sp>
+        <p:nvSpPr>
+          <p:cNvPr id="2" name="Título 1">
+            <a:extLst>
+              <a:ext uri="{FF2B5EF4-FFF2-40B4-BE49-F238E27FC236}">
+                <a16:creationId xmlns:a16="http://schemas.microsoft.com/office/drawing/2014/main" id="{288F3FB0-6C03-4EF4-BF6B-DFFE829FC827}"/>
+              </a:ext>
+            </a:extLst>
+          </p:cNvPr>
+          <p:cNvSpPr>
+            <a:spLocks noGrp="1"/>
+          </p:cNvSpPr>
+          <p:nvPr>
+            <p:ph type="title"/>
+          </p:nvPr>
+        </p:nvSpPr>
+        <p:spPr/>
+        <p:txBody>
+          <a:bodyPr/>
+          <a:lstStyle/>
+          <a:p>
+            <a:r>
+              <a:rPr lang="en-GB" dirty="0"/>
+              <a:t>Computer Vision API</a:t>
+            </a:r>
+            <a:endParaRPr lang="es-ES" dirty="0"/>
+          </a:p>
+        </p:txBody>
+      </p:sp>
+      <p:pic>
+        <p:nvPicPr>
+          <p:cNvPr id="4" name="Marcador de contenido 3">
+            <a:extLst>
+              <a:ext uri="{FF2B5EF4-FFF2-40B4-BE49-F238E27FC236}">
+                <a16:creationId xmlns:a16="http://schemas.microsoft.com/office/drawing/2014/main" id="{9E163123-16D9-4413-BF8D-5F2E60678430}"/>
+              </a:ext>
+            </a:extLst>
+          </p:cNvPr>
+          <p:cNvPicPr>
+            <a:picLocks noGrp="1" noChangeAspect="1"/>
+          </p:cNvPicPr>
+          <p:nvPr>
+            <p:ph idx="1"/>
+          </p:nvPr>
+        </p:nvPicPr>
+        <p:blipFill>
+          <a:blip r:embed="rId2"/>
+          <a:stretch>
+            <a:fillRect/>
+          </a:stretch>
+        </p:blipFill>
+        <p:spPr>
+          <a:xfrm>
+            <a:off x="136235" y="1423707"/>
+            <a:ext cx="6134956" cy="4010585"/>
+          </a:xfrm>
+          <a:prstGeom prst="rect">
+            <a:avLst/>
+          </a:prstGeom>
+        </p:spPr>
+      </p:pic>
+      <p:pic>
+        <p:nvPicPr>
+          <p:cNvPr id="5" name="Imagen 4">
+            <a:extLst>
+              <a:ext uri="{FF2B5EF4-FFF2-40B4-BE49-F238E27FC236}">
+                <a16:creationId xmlns:a16="http://schemas.microsoft.com/office/drawing/2014/main" id="{D0369CF1-9FD8-4CDC-A41F-8AD5AE58DACA}"/>
+              </a:ext>
+            </a:extLst>
+          </p:cNvPr>
+          <p:cNvPicPr>
+            <a:picLocks noChangeAspect="1"/>
+          </p:cNvPicPr>
+          <p:nvPr/>
+        </p:nvPicPr>
+        <p:blipFill>
+          <a:blip r:embed="rId3"/>
+          <a:stretch>
+            <a:fillRect/>
+          </a:stretch>
+        </p:blipFill>
+        <p:spPr>
+          <a:xfrm>
+            <a:off x="4929809" y="3048193"/>
+            <a:ext cx="7262191" cy="3809807"/>
+          </a:xfrm>
+          <a:prstGeom prst="rect">
+            <a:avLst/>
+          </a:prstGeom>
+        </p:spPr>
+      </p:pic>
+    </p:spTree>
+    <p:extLst>
+      <p:ext uri="{BB962C8B-B14F-4D97-AF65-F5344CB8AC3E}">
+        <p14:creationId xmlns:p14="http://schemas.microsoft.com/office/powerpoint/2010/main" val="2761085050"/>
+      </p:ext>
+    </p:extLst>
+  </p:cSld>
+  <p:clrMapOvr>
+    <a:masterClrMapping/>
+  </p:clrMapOvr>
+</p:sld>
+</file>
+
+<file path=ppt/slides/slide6.xml><?xml version="1.0" encoding="utf-8"?>
+<p:sld xmlns:a="http://schemas.openxmlformats.org/drawingml/2006/main" xmlns:r="http://schemas.openxmlformats.org/officeDocument/2006/relationships" xmlns:p="http://schemas.openxmlformats.org/presentationml/2006/main">
+  <p:cSld>
+    <p:spTree>
+      <p:nvGrpSpPr>
+        <p:cNvPr id="1" name=""/>
+        <p:cNvGrpSpPr/>
+        <p:nvPr/>
+      </p:nvGrpSpPr>
+      <p:grpSpPr>
+        <a:xfrm>
+          <a:off x="0" y="0"/>
+          <a:ext cx="0" cy="0"/>
+          <a:chOff x="0" y="0"/>
+          <a:chExt cx="0" cy="0"/>
+        </a:xfrm>
+      </p:grpSpPr>
+      <p:sp>
+        <p:nvSpPr>
+          <p:cNvPr id="2" name="Título 1">
+            <a:extLst>
+              <a:ext uri="{FF2B5EF4-FFF2-40B4-BE49-F238E27FC236}">
+                <a16:creationId xmlns:a16="http://schemas.microsoft.com/office/drawing/2014/main" id="{920EC307-1C53-4DB4-9B3D-1D873F9D87F8}"/>
+              </a:ext>
+            </a:extLst>
+          </p:cNvPr>
+          <p:cNvSpPr>
+            <a:spLocks noGrp="1"/>
+          </p:cNvSpPr>
+          <p:nvPr>
+            <p:ph type="title"/>
+          </p:nvPr>
+        </p:nvSpPr>
+        <p:spPr/>
+        <p:txBody>
+          <a:bodyPr/>
+          <a:lstStyle/>
+          <a:p>
+            <a:endParaRPr lang="es-ES"/>
+          </a:p>
+        </p:txBody>
+      </p:sp>
+      <p:sp>
+        <p:nvSpPr>
+          <p:cNvPr id="3" name="Marcador de contenido 2">
+            <a:extLst>
+              <a:ext uri="{FF2B5EF4-FFF2-40B4-BE49-F238E27FC236}">
+                <a16:creationId xmlns:a16="http://schemas.microsoft.com/office/drawing/2014/main" id="{C648304E-1A0E-4215-9E96-098DC426AA2E}"/>
+              </a:ext>
+            </a:extLst>
+          </p:cNvPr>
+          <p:cNvSpPr>
+            <a:spLocks noGrp="1"/>
+          </p:cNvSpPr>
+          <p:nvPr>
+            <p:ph idx="1"/>
+          </p:nvPr>
+        </p:nvSpPr>
+        <p:spPr/>
+        <p:txBody>
+          <a:bodyPr/>
+          <a:lstStyle/>
+          <a:p>
+            <a:endParaRPr lang="es-ES"/>
+          </a:p>
+        </p:txBody>
+      </p:sp>
+      <p:pic>
+        <p:nvPicPr>
+          <p:cNvPr id="4" name="Imagen 3">
+            <a:extLst>
+              <a:ext uri="{FF2B5EF4-FFF2-40B4-BE49-F238E27FC236}">
+                <a16:creationId xmlns:a16="http://schemas.microsoft.com/office/drawing/2014/main" id="{FAEA720C-CF6E-4331-A1D4-D365A2146881}"/>
+              </a:ext>
+            </a:extLst>
+          </p:cNvPr>
+          <p:cNvPicPr>
+            <a:picLocks noChangeAspect="1"/>
+          </p:cNvPicPr>
+          <p:nvPr/>
+        </p:nvPicPr>
+        <p:blipFill>
+          <a:blip r:embed="rId2"/>
+          <a:stretch>
+            <a:fillRect/>
+          </a:stretch>
+        </p:blipFill>
+        <p:spPr>
+          <a:xfrm>
+            <a:off x="2023494" y="1042654"/>
+            <a:ext cx="8145012" cy="4772691"/>
+          </a:xfrm>
+          <a:prstGeom prst="rect">
+            <a:avLst/>
+          </a:prstGeom>
+        </p:spPr>
+      </p:pic>
+    </p:spTree>
+    <p:extLst>
+      <p:ext uri="{BB962C8B-B14F-4D97-AF65-F5344CB8AC3E}">
+        <p14:creationId xmlns:p14="http://schemas.microsoft.com/office/powerpoint/2010/main" val="1542061273"/>
+      </p:ext>
+    </p:extLst>
+  </p:cSld>
+  <p:clrMapOvr>
+    <a:masterClrMapping/>
+  </p:clrMapOvr>
+</p:sld>
+</file>
+
+<file path=ppt/slides/slide7.xml><?xml version="1.0" encoding="utf-8"?>
 <p:sld xmlns:a="http://schemas.openxmlformats.org/drawingml/2006/main" xmlns:r="http://schemas.openxmlformats.org/officeDocument/2006/relationships" xmlns:p="http://schemas.openxmlformats.org/presentationml/2006/main">
   <p:cSld>
     <p:spTree>
@@ -3675,6 +4112,36 @@
           </a:p>
         </p:txBody>
       </p:sp>
+      <p:pic>
+        <p:nvPicPr>
+          <p:cNvPr id="5" name="Imagen 4">
+            <a:extLst>
+              <a:ext uri="{FF2B5EF4-FFF2-40B4-BE49-F238E27FC236}">
+                <a16:creationId xmlns:a16="http://schemas.microsoft.com/office/drawing/2014/main" id="{82A97AFF-8A04-4FC5-9756-73FD487FB9FA}"/>
+              </a:ext>
+            </a:extLst>
+          </p:cNvPr>
+          <p:cNvPicPr>
+            <a:picLocks noChangeAspect="1"/>
+          </p:cNvPicPr>
+          <p:nvPr/>
+        </p:nvPicPr>
+        <p:blipFill>
+          <a:blip r:embed="rId3"/>
+          <a:stretch>
+            <a:fillRect/>
+          </a:stretch>
+        </p:blipFill>
+        <p:spPr>
+          <a:xfrm>
+            <a:off x="6413156" y="3822863"/>
+            <a:ext cx="5778843" cy="3035137"/>
+          </a:xfrm>
+          <a:prstGeom prst="rect">
+            <a:avLst/>
+          </a:prstGeom>
+        </p:spPr>
+      </p:pic>
     </p:spTree>
     <p:extLst>
       <p:ext uri="{BB962C8B-B14F-4D97-AF65-F5344CB8AC3E}">
@@ -3688,7 +4155,7 @@
 </p:sld>
 </file>
 
-<file path=ppt/slides/slide4.xml><?xml version="1.0" encoding="utf-8"?>
+<file path=ppt/slides/slide8.xml><?xml version="1.0" encoding="utf-8"?>
 <p:sld xmlns:a="http://schemas.openxmlformats.org/drawingml/2006/main" xmlns:r="http://schemas.openxmlformats.org/officeDocument/2006/relationships" xmlns:p="http://schemas.openxmlformats.org/presentationml/2006/main">
   <p:cSld>
     <p:spTree>

</xml_diff>